<commit_message>
Add error handling and save not found URLs to file
</commit_message>
<xml_diff>
--- a/TEAM-CPC.pptx
+++ b/TEAM-CPC.pptx
@@ -5,7 +5,7 @@
     <p:sldMasterId id="2147483648" r:id="rId1"/>
   </p:sldMasterIdLst>
   <p:notesMasterIdLst>
-    <p:notesMasterId r:id="rId10"/>
+    <p:notesMasterId r:id="rId11"/>
   </p:notesMasterIdLst>
   <p:sldIdLst>
     <p:sldId id="256" r:id="rId2"/>
@@ -16,6 +16,7 @@
     <p:sldId id="261" r:id="rId7"/>
     <p:sldId id="262" r:id="rId8"/>
     <p:sldId id="263" r:id="rId9"/>
+    <p:sldId id="264" r:id="rId10"/>
   </p:sldIdLst>
   <p:sldSz cx="14630400" cy="8229600"/>
   <p:notesSz cx="8229600" cy="14630400"/>
@@ -944,6 +945,90 @@
     <p:extLst>
       <p:ext uri="{BB962C8B-B14F-4D97-AF65-F5344CB8AC3E}">
         <p14:creationId xmlns:p14="http://schemas.microsoft.com/office/powerpoint/2010/main" val="1024086991"/>
+      </p:ext>
+    </p:extLst>
+  </p:cSld>
+  <p:clrMapOvr>
+    <a:masterClrMapping/>
+  </p:clrMapOvr>
+</p:notes>
+</file>
+
+<file path=ppt/notesSlides/notesSlide9.xml><?xml version="1.0" encoding="utf-8"?>
+<p:notes xmlns:a="http://schemas.openxmlformats.org/drawingml/2006/main" xmlns:r="http://schemas.openxmlformats.org/officeDocument/2006/relationships" xmlns:p="http://schemas.openxmlformats.org/presentationml/2006/main">
+  <p:cSld>
+    <p:spTree>
+      <p:nvGrpSpPr>
+        <p:cNvPr id="1" name=""/>
+        <p:cNvGrpSpPr/>
+        <p:nvPr/>
+      </p:nvGrpSpPr>
+      <p:grpSpPr>
+        <a:xfrm>
+          <a:off x="0" y="0"/>
+          <a:ext cx="0" cy="0"/>
+          <a:chOff x="0" y="0"/>
+          <a:chExt cx="0" cy="0"/>
+        </a:xfrm>
+      </p:grpSpPr>
+      <p:sp>
+        <p:nvSpPr>
+          <p:cNvPr id="2" name="Slide Image Placeholder 1"/>
+          <p:cNvSpPr>
+            <a:spLocks noGrp="1" noRot="1" noChangeAspect="1"/>
+          </p:cNvSpPr>
+          <p:nvPr>
+            <p:ph type="sldImg"/>
+          </p:nvPr>
+        </p:nvSpPr>
+        <p:spPr/>
+      </p:sp>
+      <p:sp>
+        <p:nvSpPr>
+          <p:cNvPr id="3" name="Notes Placeholder 2"/>
+          <p:cNvSpPr>
+            <a:spLocks noGrp="1"/>
+          </p:cNvSpPr>
+          <p:nvPr>
+            <p:ph type="body" idx="1"/>
+          </p:nvPr>
+        </p:nvSpPr>
+        <p:spPr/>
+        <p:txBody>
+          <a:bodyPr/>
+          <a:lstStyle/>
+          <a:p>
+            <a:endParaRPr lang="en-US" dirty="0"/>
+          </a:p>
+        </p:txBody>
+      </p:sp>
+      <p:sp>
+        <p:nvSpPr>
+          <p:cNvPr id="4" name="Slide Number Placeholder 3"/>
+          <p:cNvSpPr>
+            <a:spLocks noGrp="1"/>
+          </p:cNvSpPr>
+          <p:nvPr>
+            <p:ph type="sldNum" sz="quarter" idx="10"/>
+          </p:nvPr>
+        </p:nvSpPr>
+        <p:spPr/>
+        <p:txBody>
+          <a:bodyPr/>
+          <a:lstStyle/>
+          <a:p>
+            <a:fld id="{F7021451-1387-4CA6-816F-3879F97B5CBC}" type="slidenum">
+              <a:rPr lang="en-US"/>
+              <a:t>9</a:t>
+            </a:fld>
+            <a:endParaRPr lang="en-US"/>
+          </a:p>
+        </p:txBody>
+      </p:sp>
+    </p:spTree>
+    <p:extLst>
+      <p:ext uri="{BB962C8B-B14F-4D97-AF65-F5344CB8AC3E}">
+        <p14:creationId xmlns:p14="http://schemas.microsoft.com/office/powerpoint/2010/main" val="1839432663"/>
       </p:ext>
     </p:extLst>
   </p:cSld>
@@ -1472,32 +1557,6 @@
           </a:p>
         </p:txBody>
       </p:sp>
-      <p:pic>
-        <p:nvPicPr>
-          <p:cNvPr id="8" name="Image 1" descr="preencoded.png">
-            <a:hlinkClick r:id="rId4"/>
-          </p:cNvPr>
-          <p:cNvPicPr>
-            <a:picLocks noChangeAspect="1"/>
-          </p:cNvPicPr>
-          <p:nvPr/>
-        </p:nvPicPr>
-        <p:blipFill>
-          <a:blip r:embed="rId5"/>
-          <a:stretch>
-            <a:fillRect/>
-          </a:stretch>
-        </p:blipFill>
-        <p:spPr>
-          <a:xfrm>
-            <a:off x="12242153" y="7589520"/>
-            <a:ext cx="2296807" cy="548640"/>
-          </a:xfrm>
-          <a:prstGeom prst="rect">
-            <a:avLst/>
-          </a:prstGeom>
-        </p:spPr>
-      </p:pic>
     </p:spTree>
   </p:cSld>
   <p:clrMapOvr>
@@ -1597,32 +1656,6 @@
       </p:sp>
       <p:pic>
         <p:nvPicPr>
-          <p:cNvPr id="6" name="Image 1" descr="preencoded.png">
-            <a:hlinkClick r:id="rId3"/>
-          </p:cNvPr>
-          <p:cNvPicPr>
-            <a:picLocks noChangeAspect="1"/>
-          </p:cNvPicPr>
-          <p:nvPr/>
-        </p:nvPicPr>
-        <p:blipFill>
-          <a:blip r:embed="rId4"/>
-          <a:stretch>
-            <a:fillRect/>
-          </a:stretch>
-        </p:blipFill>
-        <p:spPr>
-          <a:xfrm>
-            <a:off x="12242153" y="7589520"/>
-            <a:ext cx="2296807" cy="548640"/>
-          </a:xfrm>
-          <a:prstGeom prst="rect">
-            <a:avLst/>
-          </a:prstGeom>
-        </p:spPr>
-      </p:pic>
-      <p:pic>
-        <p:nvPicPr>
           <p:cNvPr id="8" name="Picture 7">
             <a:extLst>
               <a:ext uri="{FF2B5EF4-FFF2-40B4-BE49-F238E27FC236}">
@@ -1636,7 +1669,7 @@
           <p:nvPr/>
         </p:nvPicPr>
         <p:blipFill>
-          <a:blip r:embed="rId5"/>
+          <a:blip r:embed="rId3"/>
           <a:stretch>
             <a:fillRect/>
           </a:stretch>
@@ -2241,32 +2274,6 @@
           </a:p>
         </p:txBody>
       </p:sp>
-      <p:pic>
-        <p:nvPicPr>
-          <p:cNvPr id="18" name="Image 1" descr="preencoded.png">
-            <a:hlinkClick r:id="rId4"/>
-          </p:cNvPr>
-          <p:cNvPicPr>
-            <a:picLocks noChangeAspect="1"/>
-          </p:cNvPicPr>
-          <p:nvPr/>
-        </p:nvPicPr>
-        <p:blipFill>
-          <a:blip r:embed="rId5"/>
-          <a:stretch>
-            <a:fillRect/>
-          </a:stretch>
-        </p:blipFill>
-        <p:spPr>
-          <a:xfrm>
-            <a:off x="12242153" y="7589520"/>
-            <a:ext cx="2296807" cy="548640"/>
-          </a:xfrm>
-          <a:prstGeom prst="rect">
-            <a:avLst/>
-          </a:prstGeom>
-        </p:spPr>
-      </p:pic>
     </p:spTree>
   </p:cSld>
   <p:clrMapOvr>
@@ -3025,32 +3032,6 @@
           </a:p>
         </p:txBody>
       </p:sp>
-      <p:pic>
-        <p:nvPicPr>
-          <p:cNvPr id="20" name="Image 0" descr="preencoded.png">
-            <a:hlinkClick r:id="rId3"/>
-          </p:cNvPr>
-          <p:cNvPicPr>
-            <a:picLocks noChangeAspect="1"/>
-          </p:cNvPicPr>
-          <p:nvPr/>
-        </p:nvPicPr>
-        <p:blipFill>
-          <a:blip r:embed="rId4"/>
-          <a:stretch>
-            <a:fillRect/>
-          </a:stretch>
-        </p:blipFill>
-        <p:spPr>
-          <a:xfrm>
-            <a:off x="12242153" y="7589520"/>
-            <a:ext cx="2296807" cy="548640"/>
-          </a:xfrm>
-          <a:prstGeom prst="rect">
-            <a:avLst/>
-          </a:prstGeom>
-        </p:spPr>
-      </p:pic>
     </p:spTree>
   </p:cSld>
   <p:clrMapOvr>
@@ -3315,7 +3296,7 @@
                 <a:ea typeface="Inter" pitchFamily="34" charset="-122"/>
                 <a:cs typeface="Inter" pitchFamily="34" charset="-120"/>
               </a:rPr>
-              <a:t>TOR as well I2P networks are involved.</a:t>
+              <a:t>TOR as well as I2P networks are involved.</a:t>
             </a:r>
             <a:endParaRPr lang="en-US" sz="1750" dirty="0"/>
           </a:p>
@@ -3398,7 +3379,7 @@
         </p:nvSpPr>
         <p:spPr>
           <a:xfrm>
-            <a:off x="9458444" y="5950744"/>
+            <a:off x="9458444" y="5906333"/>
             <a:ext cx="2898100" cy="710803"/>
           </a:xfrm>
           <a:prstGeom prst="rect">
@@ -3474,32 +3455,6 @@
           </a:p>
         </p:txBody>
       </p:sp>
-      <p:pic>
-        <p:nvPicPr>
-          <p:cNvPr id="14" name="Image 1" descr="preencoded.png">
-            <a:hlinkClick r:id="rId4"/>
-          </p:cNvPr>
-          <p:cNvPicPr>
-            <a:picLocks noChangeAspect="1"/>
-          </p:cNvPicPr>
-          <p:nvPr/>
-        </p:nvPicPr>
-        <p:blipFill>
-          <a:blip r:embed="rId5"/>
-          <a:stretch>
-            <a:fillRect/>
-          </a:stretch>
-        </p:blipFill>
-        <p:spPr>
-          <a:xfrm>
-            <a:off x="12242153" y="7589520"/>
-            <a:ext cx="2296807" cy="548640"/>
-          </a:xfrm>
-          <a:prstGeom prst="rect">
-            <a:avLst/>
-          </a:prstGeom>
-        </p:spPr>
-      </p:pic>
     </p:spTree>
   </p:cSld>
   <p:clrMapOvr>
@@ -3694,7 +3649,7 @@
           <a:bodyPr wrap="square" rtlCol="0" anchor="t"/>
           <a:lstStyle/>
           <a:p>
-            <a:pPr marL="0" indent="0" algn="l">
+            <a:pPr marL="0" indent="0" algn="just">
               <a:lnSpc>
                 <a:spcPts val="2450"/>
               </a:lnSpc>
@@ -3802,7 +3757,7 @@
           <a:bodyPr wrap="square" rtlCol="0" anchor="t"/>
           <a:lstStyle/>
           <a:p>
-            <a:pPr marL="0" indent="0" algn="l">
+            <a:pPr marL="0" indent="0" algn="just">
               <a:lnSpc>
                 <a:spcPts val="2450"/>
               </a:lnSpc>
@@ -3910,7 +3865,7 @@
           <a:bodyPr wrap="square" rtlCol="0" anchor="t"/>
           <a:lstStyle/>
           <a:p>
-            <a:pPr marL="0" indent="0" algn="l">
+            <a:pPr marL="0" indent="0" algn="just">
               <a:lnSpc>
                 <a:spcPts val="2450"/>
               </a:lnSpc>
@@ -3931,32 +3886,6 @@
           </a:p>
         </p:txBody>
       </p:sp>
-      <p:pic>
-        <p:nvPicPr>
-          <p:cNvPr id="14" name="Image 3" descr="preencoded.png">
-            <a:hlinkClick r:id="rId6"/>
-          </p:cNvPr>
-          <p:cNvPicPr>
-            <a:picLocks noChangeAspect="1"/>
-          </p:cNvPicPr>
-          <p:nvPr/>
-        </p:nvPicPr>
-        <p:blipFill>
-          <a:blip r:embed="rId7"/>
-          <a:stretch>
-            <a:fillRect/>
-          </a:stretch>
-        </p:blipFill>
-        <p:spPr>
-          <a:xfrm>
-            <a:off x="12242153" y="7589520"/>
-            <a:ext cx="2296807" cy="548640"/>
-          </a:xfrm>
-          <a:prstGeom prst="rect">
-            <a:avLst/>
-          </a:prstGeom>
-        </p:spPr>
-      </p:pic>
     </p:spTree>
   </p:cSld>
   <p:clrMapOvr>
@@ -4010,7 +3939,7 @@
         </p:nvSpPr>
         <p:spPr>
           <a:xfrm>
-            <a:off x="22302" y="0"/>
+            <a:off x="0" y="0"/>
             <a:ext cx="14630400" cy="8229600"/>
           </a:xfrm>
           <a:prstGeom prst="rect">
@@ -4749,32 +4678,6 @@
           </a:p>
         </p:txBody>
       </p:sp>
-      <p:pic>
-        <p:nvPicPr>
-          <p:cNvPr id="24" name="Image 1" descr="preencoded.png">
-            <a:hlinkClick r:id="rId4"/>
-          </p:cNvPr>
-          <p:cNvPicPr>
-            <a:picLocks noChangeAspect="1"/>
-          </p:cNvPicPr>
-          <p:nvPr/>
-        </p:nvPicPr>
-        <p:blipFill>
-          <a:blip r:embed="rId5"/>
-          <a:stretch>
-            <a:fillRect/>
-          </a:stretch>
-        </p:blipFill>
-        <p:spPr>
-          <a:xfrm>
-            <a:off x="12242153" y="7589520"/>
-            <a:ext cx="2296807" cy="548640"/>
-          </a:xfrm>
-          <a:prstGeom prst="rect">
-            <a:avLst/>
-          </a:prstGeom>
-        </p:spPr>
-      </p:pic>
     </p:spTree>
   </p:cSld>
   <p:clrMapOvr>
@@ -4861,25 +4764,28 @@
           <a:bodyPr wrap="square" rtlCol="0" anchor="t"/>
           <a:lstStyle/>
           <a:p>
-            <a:pPr marL="0" indent="0">
+            <a:pPr marL="0" indent="0" algn="just">
               <a:lnSpc>
                 <a:spcPts val="3499"/>
               </a:lnSpc>
               <a:buNone/>
             </a:pPr>
             <a:r>
-              <a:rPr lang="en-US" sz="2187" b="1" kern="0" spc="-35" dirty="0">
+              <a:rPr lang="en-US" b="1" kern="0" spc="-35" dirty="0">
                 <a:solidFill>
                   <a:srgbClr val="E5E0DF"/>
                 </a:solidFill>
-                <a:latin typeface="Inter" pitchFamily="34" charset="0"/>
-                <a:ea typeface="Inter" pitchFamily="34" charset="-122"/>
-                <a:cs typeface="Inter" pitchFamily="34" charset="-120"/>
-              </a:rPr>
-              <a:t>4. ALERTING MECHANISM : </a:t>
-            </a:r>
-            <a:r>
-              <a:rPr lang="en-US" sz="2187" kern="0" spc="-35" dirty="0">
+                <a:highlight>
+                  <a:srgbClr val="0000FF"/>
+                </a:highlight>
+                <a:latin typeface="Inter" pitchFamily="34" charset="0"/>
+                <a:ea typeface="Inter" pitchFamily="34" charset="-122"/>
+                <a:cs typeface="Inter" pitchFamily="34" charset="-120"/>
+              </a:rPr>
+              <a:t>4.  </a:t>
+            </a:r>
+            <a:r>
+              <a:rPr lang="en-US" b="1" kern="0" spc="-35" dirty="0">
                 <a:solidFill>
                   <a:srgbClr val="E5E0DF"/>
                 </a:solidFill>
@@ -4887,10 +4793,21 @@
                 <a:ea typeface="Inter" pitchFamily="34" charset="-122"/>
                 <a:cs typeface="Inter" pitchFamily="34" charset="-120"/>
               </a:rPr>
+              <a:t>ALERTING MECHANISM : </a:t>
+            </a:r>
+            <a:r>
+              <a:rPr lang="en-US" kern="0" spc="-35" dirty="0">
+                <a:solidFill>
+                  <a:srgbClr val="E5E0DF"/>
+                </a:solidFill>
+                <a:latin typeface="Inter" pitchFamily="34" charset="0"/>
+                <a:ea typeface="Inter" pitchFamily="34" charset="-122"/>
+                <a:cs typeface="Inter" pitchFamily="34" charset="-120"/>
+              </a:rPr>
               <a:t>In our project, meticulously scrutinized data is identified for potential leaks across networks and securely stored in a centralized dump. This forms the basis for an advanced alert system, enabling users to promptly check the status of their credentials and take swift action in case of compromise. Our streamlined processes ensure robust security measures for proactive defense against potential threats</a:t>
             </a:r>
             <a:r>
-              <a:rPr lang="en-US" sz="2187" b="1" kern="0" spc="-35" dirty="0">
+              <a:rPr lang="en-US" b="1" kern="0" spc="-35" dirty="0">
                 <a:solidFill>
                   <a:srgbClr val="E5E0DF"/>
                 </a:solidFill>
@@ -4900,37 +4817,260 @@
               </a:rPr>
               <a:t>.</a:t>
             </a:r>
-            <a:endParaRPr lang="en-US" sz="2187" dirty="0"/>
-          </a:p>
-        </p:txBody>
-      </p:sp>
-      <p:pic>
-        <p:nvPicPr>
-          <p:cNvPr id="5" name="Image 0" descr="preencoded.png">
-            <a:hlinkClick r:id="rId3"/>
+            <a:endParaRPr lang="en-US" dirty="0"/>
+          </a:p>
+        </p:txBody>
+      </p:sp>
+    </p:spTree>
+  </p:cSld>
+  <p:clrMapOvr>
+    <a:masterClrMapping/>
+  </p:clrMapOvr>
+</p:sld>
+</file>
+
+<file path=ppt/slides/slide9.xml><?xml version="1.0" encoding="utf-8"?>
+<p:sld xmlns:a="http://schemas.openxmlformats.org/drawingml/2006/main" xmlns:r="http://schemas.openxmlformats.org/officeDocument/2006/relationships" xmlns:p="http://schemas.openxmlformats.org/presentationml/2006/main">
+  <p:cSld>
+    <p:spTree>
+      <p:nvGrpSpPr>
+        <p:cNvPr id="1" name=""/>
+        <p:cNvGrpSpPr/>
+        <p:nvPr/>
+      </p:nvGrpSpPr>
+      <p:grpSpPr>
+        <a:xfrm>
+          <a:off x="0" y="0"/>
+          <a:ext cx="0" cy="0"/>
+          <a:chOff x="0" y="0"/>
+          <a:chExt cx="0" cy="0"/>
+        </a:xfrm>
+      </p:grpSpPr>
+      <p:sp>
+        <p:nvSpPr>
+          <p:cNvPr id="2" name="Shape 0"/>
+          <p:cNvSpPr/>
+          <p:nvPr/>
+        </p:nvSpPr>
+        <p:spPr>
+          <a:xfrm>
+            <a:off x="0" y="0"/>
+            <a:ext cx="14630400" cy="8229600"/>
+          </a:xfrm>
+          <a:prstGeom prst="rect">
+            <a:avLst/>
+          </a:prstGeom>
+          <a:solidFill>
+            <a:srgbClr val="0C0C0C"/>
+          </a:solidFill>
+          <a:ln/>
+        </p:spPr>
+      </p:sp>
+      <p:sp>
+        <p:nvSpPr>
+          <p:cNvPr id="3" name="Shape 1"/>
+          <p:cNvSpPr/>
+          <p:nvPr/>
+        </p:nvSpPr>
+        <p:spPr>
+          <a:xfrm>
+            <a:off x="0" y="0"/>
+            <a:ext cx="14630400" cy="8229600"/>
+          </a:xfrm>
+          <a:prstGeom prst="rect">
+            <a:avLst/>
+          </a:prstGeom>
+          <a:solidFill>
+            <a:srgbClr val="272525"/>
+          </a:solidFill>
+          <a:ln/>
+        </p:spPr>
+      </p:sp>
+      <p:sp>
+        <p:nvSpPr>
+          <p:cNvPr id="4" name="Text 2"/>
+          <p:cNvSpPr/>
+          <p:nvPr/>
+        </p:nvSpPr>
+        <p:spPr>
+          <a:xfrm>
+            <a:off x="2037993" y="2781776"/>
+            <a:ext cx="10554414" cy="2666048"/>
+          </a:xfrm>
+          <a:prstGeom prst="rect">
+            <a:avLst/>
+          </a:prstGeom>
+          <a:noFill/>
+          <a:ln/>
+        </p:spPr>
+        <p:txBody>
+          <a:bodyPr wrap="square" rtlCol="0" anchor="t"/>
+          <a:lstStyle/>
+          <a:p>
+            <a:pPr marL="0" indent="0" algn="just">
+              <a:lnSpc>
+                <a:spcPts val="3499"/>
+              </a:lnSpc>
+              <a:buNone/>
+            </a:pPr>
+            <a:endParaRPr lang="en-US" dirty="0"/>
+          </a:p>
+        </p:txBody>
+      </p:sp>
+      <p:sp>
+        <p:nvSpPr>
+          <p:cNvPr id="5" name="TextBox 4">
+            <a:extLst>
+              <a:ext uri="{FF2B5EF4-FFF2-40B4-BE49-F238E27FC236}">
+                <a16:creationId xmlns:a16="http://schemas.microsoft.com/office/drawing/2014/main" id="{F7F22E60-9220-4448-4C6A-36941932738C}"/>
+              </a:ext>
+            </a:extLst>
           </p:cNvPr>
-          <p:cNvPicPr>
-            <a:picLocks noChangeAspect="1"/>
-          </p:cNvPicPr>
-          <p:nvPr/>
-        </p:nvPicPr>
-        <p:blipFill>
-          <a:blip r:embed="rId4"/>
-          <a:stretch>
-            <a:fillRect/>
-          </a:stretch>
-        </p:blipFill>
-        <p:spPr>
-          <a:xfrm>
-            <a:off x="12242153" y="7589520"/>
-            <a:ext cx="2296807" cy="548640"/>
-          </a:xfrm>
-          <a:prstGeom prst="rect">
-            <a:avLst/>
-          </a:prstGeom>
-        </p:spPr>
-      </p:pic>
+          <p:cNvSpPr txBox="1"/>
+          <p:nvPr/>
+        </p:nvSpPr>
+        <p:spPr>
+          <a:xfrm>
+            <a:off x="0" y="0"/>
+            <a:ext cx="14630400" cy="3154710"/>
+          </a:xfrm>
+          <a:prstGeom prst="rect">
+            <a:avLst/>
+          </a:prstGeom>
+          <a:noFill/>
+        </p:spPr>
+        <p:txBody>
+          <a:bodyPr wrap="square" rtlCol="0">
+            <a:spAutoFit/>
+          </a:bodyPr>
+          <a:lstStyle/>
+          <a:p>
+            <a:pPr algn="ctr"/>
+            <a:r>
+              <a:rPr lang="en-US" sz="19900" dirty="0">
+                <a:solidFill>
+                  <a:schemeClr val="bg1"/>
+                </a:solidFill>
+              </a:rPr>
+              <a:t>Thank You</a:t>
+            </a:r>
+            <a:endParaRPr lang="en-IN" sz="19900" dirty="0">
+              <a:solidFill>
+                <a:schemeClr val="bg1"/>
+              </a:solidFill>
+            </a:endParaRPr>
+          </a:p>
+        </p:txBody>
+      </p:sp>
+      <p:sp>
+        <p:nvSpPr>
+          <p:cNvPr id="6" name="TextBox 5">
+            <a:extLst>
+              <a:ext uri="{FF2B5EF4-FFF2-40B4-BE49-F238E27FC236}">
+                <a16:creationId xmlns:a16="http://schemas.microsoft.com/office/drawing/2014/main" id="{8E00264E-27AB-7081-A622-E614FFDF3FB0}"/>
+              </a:ext>
+            </a:extLst>
+          </p:cNvPr>
+          <p:cNvSpPr txBox="1"/>
+          <p:nvPr/>
+        </p:nvSpPr>
+        <p:spPr>
+          <a:xfrm>
+            <a:off x="0" y="4723075"/>
+            <a:ext cx="14630400" cy="2800767"/>
+          </a:xfrm>
+          <a:prstGeom prst="rect">
+            <a:avLst/>
+          </a:prstGeom>
+          <a:noFill/>
+        </p:spPr>
+        <p:txBody>
+          <a:bodyPr wrap="square" rtlCol="0">
+            <a:spAutoFit/>
+          </a:bodyPr>
+          <a:lstStyle/>
+          <a:p>
+            <a:pPr lvl="1"/>
+            <a:r>
+              <a:rPr lang="en-US" sz="4400" b="1" dirty="0">
+                <a:solidFill>
+                  <a:schemeClr val="bg1"/>
+                </a:solidFill>
+              </a:rPr>
+              <a:t>Team Members:</a:t>
+            </a:r>
+          </a:p>
+          <a:p>
+            <a:pPr marL="742950" lvl="1" indent="-285750">
+              <a:buFont typeface="Arial" panose="020B0604020202020204" pitchFamily="34" charset="0"/>
+              <a:buChar char="•"/>
+            </a:pPr>
+            <a:r>
+              <a:rPr lang="en-US" sz="4400" dirty="0">
+                <a:solidFill>
+                  <a:schemeClr val="bg1"/>
+                </a:solidFill>
+              </a:rPr>
+              <a:t>Ayush Agrawal</a:t>
+            </a:r>
+          </a:p>
+          <a:p>
+            <a:pPr marL="742950" lvl="1" indent="-285750">
+              <a:buFont typeface="Arial" panose="020B0604020202020204" pitchFamily="34" charset="0"/>
+              <a:buChar char="•"/>
+            </a:pPr>
+            <a:r>
+              <a:rPr lang="en-US" sz="4400" dirty="0">
+                <a:solidFill>
+                  <a:schemeClr val="bg1"/>
+                </a:solidFill>
+              </a:rPr>
+              <a:t>Ritik Bhatt</a:t>
+            </a:r>
+          </a:p>
+          <a:p>
+            <a:pPr marL="742950" lvl="1" indent="-285750">
+              <a:buFont typeface="Arial" panose="020B0604020202020204" pitchFamily="34" charset="0"/>
+              <a:buChar char="•"/>
+            </a:pPr>
+            <a:r>
+              <a:rPr lang="en-US" sz="4400" dirty="0" err="1">
+                <a:solidFill>
+                  <a:schemeClr val="bg1"/>
+                </a:solidFill>
+              </a:rPr>
+              <a:t>Suryansh</a:t>
+            </a:r>
+            <a:r>
+              <a:rPr lang="en-US" sz="4400" dirty="0">
+                <a:solidFill>
+                  <a:schemeClr val="bg1"/>
+                </a:solidFill>
+              </a:rPr>
+              <a:t> </a:t>
+            </a:r>
+            <a:r>
+              <a:rPr lang="en-US" sz="4400" dirty="0" err="1">
+                <a:solidFill>
+                  <a:schemeClr val="bg1"/>
+                </a:solidFill>
+              </a:rPr>
+              <a:t>Deshwal</a:t>
+            </a:r>
+            <a:endParaRPr lang="en-US" sz="4400" dirty="0">
+              <a:solidFill>
+                <a:schemeClr val="bg1"/>
+              </a:solidFill>
+            </a:endParaRPr>
+          </a:p>
+        </p:txBody>
+      </p:sp>
     </p:spTree>
+    <p:extLst>
+      <p:ext uri="{BB962C8B-B14F-4D97-AF65-F5344CB8AC3E}">
+        <p14:creationId xmlns:p14="http://schemas.microsoft.com/office/powerpoint/2010/main" val="1903591276"/>
+      </p:ext>
+    </p:extLst>
   </p:cSld>
   <p:clrMapOvr>
     <a:masterClrMapping/>

</xml_diff>